<commit_message>
Updated submitting jobs talk
</commit_message>
<xml_diff>
--- a/Basics_Supercomputing/submitting_jobs_supercomputer.pptx
+++ b/Basics_Supercomputing/submitting_jobs_supercomputer.pptx
@@ -5,10 +5,10 @@
     <p:sldMasterId id="2147483815" r:id="rId1"/>
   </p:sldMasterIdLst>
   <p:notesMasterIdLst>
-    <p:notesMasterId r:id="rId23"/>
+    <p:notesMasterId r:id="rId25"/>
   </p:notesMasterIdLst>
   <p:handoutMasterIdLst>
-    <p:handoutMasterId r:id="rId24"/>
+    <p:handoutMasterId r:id="rId26"/>
   </p:handoutMasterIdLst>
   <p:sldIdLst>
     <p:sldId id="257" r:id="rId2"/>
@@ -31,7 +31,9 @@
     <p:sldId id="316" r:id="rId19"/>
     <p:sldId id="315" r:id="rId20"/>
     <p:sldId id="317" r:id="rId21"/>
-    <p:sldId id="297" r:id="rId22"/>
+    <p:sldId id="318" r:id="rId22"/>
+    <p:sldId id="319" r:id="rId23"/>
+    <p:sldId id="297" r:id="rId24"/>
   </p:sldIdLst>
   <p:sldSz cx="9144000" cy="6858000" type="screen4x3"/>
   <p:notesSz cx="6858000" cy="9144000"/>
@@ -825,6 +827,174 @@
     <p:extLst>
       <p:ext uri="{BB962C8B-B14F-4D97-AF65-F5344CB8AC3E}">
         <p14:creationId xmlns:p14="http://schemas.microsoft.com/office/powerpoint/2010/main" val="1083007469"/>
+      </p:ext>
+    </p:extLst>
+  </p:cSld>
+  <p:clrMapOvr>
+    <a:masterClrMapping/>
+  </p:clrMapOvr>
+</p:notes>
+</file>
+
+<file path=ppt/notesSlides/notesSlide11.xml><?xml version="1.0" encoding="utf-8"?>
+<p:notes xmlns:a="http://schemas.openxmlformats.org/drawingml/2006/main" xmlns:r="http://schemas.openxmlformats.org/officeDocument/2006/relationships" xmlns:p="http://schemas.openxmlformats.org/presentationml/2006/main">
+  <p:cSld>
+    <p:spTree>
+      <p:nvGrpSpPr>
+        <p:cNvPr id="1" name=""/>
+        <p:cNvGrpSpPr/>
+        <p:nvPr/>
+      </p:nvGrpSpPr>
+      <p:grpSpPr>
+        <a:xfrm>
+          <a:off x="0" y="0"/>
+          <a:ext cx="0" cy="0"/>
+          <a:chOff x="0" y="0"/>
+          <a:chExt cx="0" cy="0"/>
+        </a:xfrm>
+      </p:grpSpPr>
+      <p:sp>
+        <p:nvSpPr>
+          <p:cNvPr id="2" name="Slide Image Placeholder 1"/>
+          <p:cNvSpPr>
+            <a:spLocks noGrp="1" noRot="1" noChangeAspect="1"/>
+          </p:cNvSpPr>
+          <p:nvPr>
+            <p:ph type="sldImg"/>
+          </p:nvPr>
+        </p:nvSpPr>
+        <p:spPr/>
+      </p:sp>
+      <p:sp>
+        <p:nvSpPr>
+          <p:cNvPr id="3" name="Notes Placeholder 2"/>
+          <p:cNvSpPr>
+            <a:spLocks noGrp="1"/>
+          </p:cNvSpPr>
+          <p:nvPr>
+            <p:ph type="body" idx="1"/>
+          </p:nvPr>
+        </p:nvSpPr>
+        <p:spPr/>
+        <p:txBody>
+          <a:bodyPr/>
+          <a:lstStyle/>
+          <a:p>
+            <a:endParaRPr lang="en-US" dirty="0"/>
+          </a:p>
+        </p:txBody>
+      </p:sp>
+      <p:sp>
+        <p:nvSpPr>
+          <p:cNvPr id="4" name="Slide Number Placeholder 3"/>
+          <p:cNvSpPr>
+            <a:spLocks noGrp="1"/>
+          </p:cNvSpPr>
+          <p:nvPr>
+            <p:ph type="sldNum" sz="quarter" idx="10"/>
+          </p:nvPr>
+        </p:nvSpPr>
+        <p:spPr/>
+        <p:txBody>
+          <a:bodyPr/>
+          <a:lstStyle/>
+          <a:p>
+            <a:fld id="{08008AE1-FA72-B840-8C8E-D06497C18101}" type="slidenum">
+              <a:rPr lang="en-US" smtClean="0"/>
+              <a:t>21</a:t>
+            </a:fld>
+            <a:endParaRPr lang="en-US"/>
+          </a:p>
+        </p:txBody>
+      </p:sp>
+    </p:spTree>
+    <p:extLst>
+      <p:ext uri="{BB962C8B-B14F-4D97-AF65-F5344CB8AC3E}">
+        <p14:creationId xmlns:p14="http://schemas.microsoft.com/office/powerpoint/2010/main" val="492444090"/>
+      </p:ext>
+    </p:extLst>
+  </p:cSld>
+  <p:clrMapOvr>
+    <a:masterClrMapping/>
+  </p:clrMapOvr>
+</p:notes>
+</file>
+
+<file path=ppt/notesSlides/notesSlide12.xml><?xml version="1.0" encoding="utf-8"?>
+<p:notes xmlns:a="http://schemas.openxmlformats.org/drawingml/2006/main" xmlns:r="http://schemas.openxmlformats.org/officeDocument/2006/relationships" xmlns:p="http://schemas.openxmlformats.org/presentationml/2006/main">
+  <p:cSld>
+    <p:spTree>
+      <p:nvGrpSpPr>
+        <p:cNvPr id="1" name=""/>
+        <p:cNvGrpSpPr/>
+        <p:nvPr/>
+      </p:nvGrpSpPr>
+      <p:grpSpPr>
+        <a:xfrm>
+          <a:off x="0" y="0"/>
+          <a:ext cx="0" cy="0"/>
+          <a:chOff x="0" y="0"/>
+          <a:chExt cx="0" cy="0"/>
+        </a:xfrm>
+      </p:grpSpPr>
+      <p:sp>
+        <p:nvSpPr>
+          <p:cNvPr id="2" name="Slide Image Placeholder 1"/>
+          <p:cNvSpPr>
+            <a:spLocks noGrp="1" noRot="1" noChangeAspect="1"/>
+          </p:cNvSpPr>
+          <p:nvPr>
+            <p:ph type="sldImg"/>
+          </p:nvPr>
+        </p:nvSpPr>
+        <p:spPr/>
+      </p:sp>
+      <p:sp>
+        <p:nvSpPr>
+          <p:cNvPr id="3" name="Notes Placeholder 2"/>
+          <p:cNvSpPr>
+            <a:spLocks noGrp="1"/>
+          </p:cNvSpPr>
+          <p:nvPr>
+            <p:ph type="body" idx="1"/>
+          </p:nvPr>
+        </p:nvSpPr>
+        <p:spPr/>
+        <p:txBody>
+          <a:bodyPr/>
+          <a:lstStyle/>
+          <a:p>
+            <a:endParaRPr lang="en-US" dirty="0"/>
+          </a:p>
+        </p:txBody>
+      </p:sp>
+      <p:sp>
+        <p:nvSpPr>
+          <p:cNvPr id="4" name="Slide Number Placeholder 3"/>
+          <p:cNvSpPr>
+            <a:spLocks noGrp="1"/>
+          </p:cNvSpPr>
+          <p:nvPr>
+            <p:ph type="sldNum" sz="quarter" idx="10"/>
+          </p:nvPr>
+        </p:nvSpPr>
+        <p:spPr/>
+        <p:txBody>
+          <a:bodyPr/>
+          <a:lstStyle/>
+          <a:p>
+            <a:fld id="{08008AE1-FA72-B840-8C8E-D06497C18101}" type="slidenum">
+              <a:rPr lang="en-US" smtClean="0"/>
+              <a:t>22</a:t>
+            </a:fld>
+            <a:endParaRPr lang="en-US"/>
+          </a:p>
+        </p:txBody>
+      </p:sp>
+    </p:spTree>
+    <p:extLst>
+      <p:ext uri="{BB962C8B-B14F-4D97-AF65-F5344CB8AC3E}">
+        <p14:creationId xmlns:p14="http://schemas.microsoft.com/office/powerpoint/2010/main" val="1226310986"/>
       </p:ext>
     </p:extLst>
   </p:cSld>
@@ -5090,7 +5260,7 @@
             </a:r>
             <a:r>
               <a:rPr lang="en-US" dirty="0" err="1" smtClean="0"/>
-              <a:t>ParaView</a:t>
+              <a:t>TotalView</a:t>
             </a:r>
             <a:endParaRPr lang="en-US" dirty="0" smtClean="0"/>
           </a:p>
@@ -5303,7 +5473,7 @@
             </a:r>
             <a:r>
               <a:rPr lang="en-US" dirty="0" err="1" smtClean="0"/>
-              <a:t>matlab_tutorial_general_code.m</a:t>
+              <a:t>matlab_tic.m</a:t>
             </a:r>
             <a:endParaRPr lang="en-US" dirty="0" smtClean="0"/>
           </a:p>
@@ -5815,7 +5985,7 @@
         </p:spPr>
         <p:txBody>
           <a:bodyPr>
-            <a:normAutofit/>
+            <a:normAutofit fontScale="92500"/>
           </a:bodyPr>
           <a:lstStyle/>
           <a:p>
@@ -5850,7 +6020,7 @@
               <a:buNone/>
             </a:pPr>
             <a:r>
-              <a:rPr lang="en-US" sz="1900" dirty="0">
+              <a:rPr lang="en-US" sz="2000" dirty="0">
                 <a:latin typeface="Courier New" charset="0"/>
                 <a:ea typeface="Courier New" charset="0"/>
                 <a:cs typeface="Courier New" charset="0"/>
@@ -5863,7 +6033,7 @@
               <a:buNone/>
             </a:pPr>
             <a:r>
-              <a:rPr lang="en-US" sz="1900" dirty="0">
+              <a:rPr lang="en-US" sz="2000" dirty="0">
                 <a:latin typeface="Courier New" charset="0"/>
                 <a:ea typeface="Courier New" charset="0"/>
                 <a:cs typeface="Courier New" charset="0"/>
@@ -5871,7 +6041,7 @@
               <a:t>#SBATCH -N 1                      </a:t>
             </a:r>
             <a:r>
-              <a:rPr lang="en-US" sz="1900" dirty="0" smtClean="0">
+              <a:rPr lang="en-US" sz="2000" dirty="0" smtClean="0">
                 <a:latin typeface="Courier New" charset="0"/>
                 <a:ea typeface="Courier New" charset="0"/>
                 <a:cs typeface="Courier New" charset="0"/>
@@ -5879,7 +6049,7 @@
               <a:t># </a:t>
             </a:r>
             <a:r>
-              <a:rPr lang="en-US" sz="1900" dirty="0">
+              <a:rPr lang="en-US" sz="2000" dirty="0">
                 <a:latin typeface="Courier New" charset="0"/>
                 <a:ea typeface="Courier New" charset="0"/>
                 <a:cs typeface="Courier New" charset="0"/>
@@ -5892,15 +6062,15 @@
               <a:buNone/>
             </a:pPr>
             <a:r>
-              <a:rPr lang="de-DE" sz="1900" dirty="0">
-                <a:latin typeface="Courier New" charset="0"/>
-                <a:ea typeface="Courier New" charset="0"/>
-                <a:cs typeface="Courier New" charset="0"/>
-              </a:rPr>
-              <a:t>#SBATCH --time=0:01:00            </a:t>
-            </a:r>
-            <a:r>
-              <a:rPr lang="de-DE" sz="1900" dirty="0" smtClean="0">
+              <a:rPr lang="de-DE" sz="2000" dirty="0">
+                <a:latin typeface="Courier New" charset="0"/>
+                <a:ea typeface="Courier New" charset="0"/>
+                <a:cs typeface="Courier New" charset="0"/>
+              </a:rPr>
+              <a:t>#SBATCH --time=0:02:00            </a:t>
+            </a:r>
+            <a:r>
+              <a:rPr lang="de-DE" sz="2000" dirty="0" smtClean="0">
                 <a:latin typeface="Courier New" charset="0"/>
                 <a:ea typeface="Courier New" charset="0"/>
                 <a:cs typeface="Courier New" charset="0"/>
@@ -5908,7 +6078,7 @@
               <a:t># </a:t>
             </a:r>
             <a:r>
-              <a:rPr lang="de-DE" sz="1900" dirty="0">
+              <a:rPr lang="de-DE" sz="2000" dirty="0">
                 <a:latin typeface="Courier New" charset="0"/>
                 <a:ea typeface="Courier New" charset="0"/>
                 <a:cs typeface="Courier New" charset="0"/>
@@ -5916,14 +6086,14 @@
               <a:t>Max </a:t>
             </a:r>
             <a:r>
-              <a:rPr lang="de-DE" sz="1900" dirty="0" err="1">
+              <a:rPr lang="de-DE" sz="2000" dirty="0" err="1">
                 <a:latin typeface="Courier New" charset="0"/>
                 <a:ea typeface="Courier New" charset="0"/>
                 <a:cs typeface="Courier New" charset="0"/>
               </a:rPr>
               <a:t>walltime</a:t>
             </a:r>
-            <a:endParaRPr lang="de-DE" sz="1900" dirty="0">
+            <a:endParaRPr lang="de-DE" sz="2000" dirty="0">
               <a:latin typeface="Courier New" charset="0"/>
               <a:ea typeface="Courier New" charset="0"/>
               <a:cs typeface="Courier New" charset="0"/>
@@ -5934,39 +6104,39 @@
               <a:buNone/>
             </a:pPr>
             <a:r>
-              <a:rPr lang="de-DE" sz="1900" dirty="0">
-                <a:latin typeface="Courier New" charset="0"/>
-                <a:ea typeface="Courier New" charset="0"/>
-                <a:cs typeface="Courier New" charset="0"/>
-              </a:rPr>
-              <a:t>#SBATCH --</a:t>
-            </a:r>
-            <a:r>
-              <a:rPr lang="de-DE" sz="1900" dirty="0" smtClean="0">
-                <a:latin typeface="Courier New" charset="0"/>
-                <a:ea typeface="Courier New" charset="0"/>
-                <a:cs typeface="Courier New" charset="0"/>
-              </a:rPr>
-              <a:t>job-name=</a:t>
-            </a:r>
-            <a:r>
-              <a:rPr lang="de-DE" sz="1900" dirty="0" err="1" smtClean="0">
-                <a:latin typeface="Courier New" charset="0"/>
-                <a:ea typeface="Courier New" charset="0"/>
-                <a:cs typeface="Courier New" charset="0"/>
-              </a:rPr>
-              <a:t>hostname</a:t>
-            </a:r>
-            <a:r>
-              <a:rPr lang="de-DE" sz="1900" dirty="0" smtClean="0">
-                <a:latin typeface="Courier New" charset="0"/>
-                <a:ea typeface="Courier New" charset="0"/>
-                <a:cs typeface="Courier New" charset="0"/>
-              </a:rPr>
-              <a:t>       # </a:t>
-            </a:r>
-            <a:r>
-              <a:rPr lang="de-DE" sz="1900" dirty="0">
+              <a:rPr lang="de-DE" sz="2000" dirty="0">
+                <a:latin typeface="Courier New" charset="0"/>
+                <a:ea typeface="Courier New" charset="0"/>
+                <a:cs typeface="Courier New" charset="0"/>
+              </a:rPr>
+              <a:t>#SBATCH --job-name=</a:t>
+            </a:r>
+            <a:r>
+              <a:rPr lang="de-DE" sz="2000" dirty="0" err="1">
+                <a:latin typeface="Courier New" charset="0"/>
+                <a:ea typeface="Courier New" charset="0"/>
+                <a:cs typeface="Courier New" charset="0"/>
+              </a:rPr>
+              <a:t>Matlab</a:t>
+            </a:r>
+            <a:r>
+              <a:rPr lang="de-DE" sz="2000" dirty="0">
+                <a:latin typeface="Courier New" charset="0"/>
+                <a:ea typeface="Courier New" charset="0"/>
+                <a:cs typeface="Courier New" charset="0"/>
+              </a:rPr>
+              <a:t>         </a:t>
+            </a:r>
+            <a:r>
+              <a:rPr lang="de-DE" sz="2000" dirty="0" smtClean="0">
+                <a:latin typeface="Courier New" charset="0"/>
+                <a:ea typeface="Courier New" charset="0"/>
+                <a:cs typeface="Courier New" charset="0"/>
+              </a:rPr>
+              <a:t># </a:t>
+            </a:r>
+            <a:r>
+              <a:rPr lang="de-DE" sz="2000" dirty="0">
                 <a:latin typeface="Courier New" charset="0"/>
                 <a:ea typeface="Courier New" charset="0"/>
                 <a:cs typeface="Courier New" charset="0"/>
@@ -5974,7 +6144,7 @@
               <a:t>Job </a:t>
             </a:r>
             <a:r>
-              <a:rPr lang="de-DE" sz="1900" dirty="0" err="1">
+              <a:rPr lang="de-DE" sz="2000" dirty="0" err="1">
                 <a:latin typeface="Courier New" charset="0"/>
                 <a:ea typeface="Courier New" charset="0"/>
                 <a:cs typeface="Courier New" charset="0"/>
@@ -5982,7 +6152,7 @@
               <a:t>submission</a:t>
             </a:r>
             <a:r>
-              <a:rPr lang="de-DE" sz="1900" dirty="0">
+              <a:rPr lang="de-DE" sz="2000" dirty="0">
                 <a:latin typeface="Courier New" charset="0"/>
                 <a:ea typeface="Courier New" charset="0"/>
                 <a:cs typeface="Courier New" charset="0"/>
@@ -5990,14 +6160,14 @@
               <a:t> </a:t>
             </a:r>
             <a:r>
-              <a:rPr lang="de-DE" sz="1900" dirty="0" err="1" smtClean="0">
+              <a:rPr lang="de-DE" sz="2000" dirty="0" err="1">
                 <a:latin typeface="Courier New" charset="0"/>
                 <a:ea typeface="Courier New" charset="0"/>
                 <a:cs typeface="Courier New" charset="0"/>
               </a:rPr>
               <a:t>name</a:t>
             </a:r>
-            <a:endParaRPr lang="de-DE" sz="1900" dirty="0" smtClean="0">
+            <a:endParaRPr lang="de-DE" sz="2000" dirty="0">
               <a:latin typeface="Courier New" charset="0"/>
               <a:ea typeface="Courier New" charset="0"/>
               <a:cs typeface="Courier New" charset="0"/>
@@ -6008,47 +6178,39 @@
               <a:buNone/>
             </a:pPr>
             <a:r>
-              <a:rPr lang="de-DE" sz="1900" dirty="0" smtClean="0">
-                <a:latin typeface="Courier New" charset="0"/>
-                <a:ea typeface="Courier New" charset="0"/>
-                <a:cs typeface="Courier New" charset="0"/>
-              </a:rPr>
-              <a:t>#</a:t>
-            </a:r>
-            <a:r>
-              <a:rPr lang="de-DE" sz="1900" dirty="0">
-                <a:latin typeface="Courier New" charset="0"/>
-                <a:ea typeface="Courier New" charset="0"/>
-                <a:cs typeface="Courier New" charset="0"/>
-              </a:rPr>
-              <a:t>SBATCH --</a:t>
-            </a:r>
-            <a:r>
-              <a:rPr lang="de-DE" sz="1900" dirty="0" smtClean="0">
-                <a:latin typeface="Courier New" charset="0"/>
-                <a:ea typeface="Courier New" charset="0"/>
-                <a:cs typeface="Courier New" charset="0"/>
-              </a:rPr>
-              <a:t>output=</a:t>
-            </a:r>
-            <a:r>
-              <a:rPr lang="de-DE" sz="1900" dirty="0" err="1" smtClean="0">
-                <a:latin typeface="Courier New" charset="0"/>
-                <a:ea typeface="Courier New" charset="0"/>
-                <a:cs typeface="Courier New" charset="0"/>
-              </a:rPr>
-              <a:t>hostname.out</a:t>
-            </a:r>
-            <a:r>
-              <a:rPr lang="de-DE" sz="1900" dirty="0" smtClean="0">
-                <a:latin typeface="Courier New" charset="0"/>
-                <a:ea typeface="Courier New" charset="0"/>
-                <a:cs typeface="Courier New" charset="0"/>
-              </a:rPr>
-              <a:t>     # </a:t>
-            </a:r>
-            <a:r>
-              <a:rPr lang="de-DE" sz="1900" dirty="0">
+              <a:rPr lang="de-DE" sz="2000" dirty="0">
+                <a:latin typeface="Courier New" charset="0"/>
+                <a:ea typeface="Courier New" charset="0"/>
+                <a:cs typeface="Courier New" charset="0"/>
+              </a:rPr>
+              <a:t>#SBATCH --output=</a:t>
+            </a:r>
+            <a:r>
+              <a:rPr lang="de-DE" sz="2000" dirty="0" err="1">
+                <a:latin typeface="Courier New" charset="0"/>
+                <a:ea typeface="Courier New" charset="0"/>
+                <a:cs typeface="Courier New" charset="0"/>
+              </a:rPr>
+              <a:t>Matlab.out</a:t>
+            </a:r>
+            <a:r>
+              <a:rPr lang="de-DE" sz="2000" dirty="0">
+                <a:latin typeface="Courier New" charset="0"/>
+                <a:ea typeface="Courier New" charset="0"/>
+                <a:cs typeface="Courier New" charset="0"/>
+              </a:rPr>
+              <a:t>       </a:t>
+            </a:r>
+            <a:r>
+              <a:rPr lang="de-DE" sz="2000" dirty="0" smtClean="0">
+                <a:latin typeface="Courier New" charset="0"/>
+                <a:ea typeface="Courier New" charset="0"/>
+                <a:cs typeface="Courier New" charset="0"/>
+              </a:rPr>
+              <a:t># </a:t>
+            </a:r>
+            <a:r>
+              <a:rPr lang="de-DE" sz="2000" dirty="0">
                 <a:latin typeface="Courier New" charset="0"/>
                 <a:ea typeface="Courier New" charset="0"/>
                 <a:cs typeface="Courier New" charset="0"/>
@@ -6056,7 +6218,7 @@
               <a:t>Output </a:t>
             </a:r>
             <a:r>
-              <a:rPr lang="de-DE" sz="1900" dirty="0" err="1">
+              <a:rPr lang="de-DE" sz="2000" dirty="0" err="1">
                 <a:latin typeface="Courier New" charset="0"/>
                 <a:ea typeface="Courier New" charset="0"/>
                 <a:cs typeface="Courier New" charset="0"/>
@@ -6064,7 +6226,7 @@
               <a:t>file</a:t>
             </a:r>
             <a:r>
-              <a:rPr lang="de-DE" sz="1900" dirty="0">
+              <a:rPr lang="de-DE" sz="2000" dirty="0">
                 <a:latin typeface="Courier New" charset="0"/>
                 <a:ea typeface="Courier New" charset="0"/>
                 <a:cs typeface="Courier New" charset="0"/>
@@ -6072,14 +6234,14 @@
               <a:t> </a:t>
             </a:r>
             <a:r>
-              <a:rPr lang="de-DE" sz="1900" dirty="0" err="1">
+              <a:rPr lang="de-DE" sz="2000" dirty="0" err="1">
                 <a:latin typeface="Courier New" charset="0"/>
                 <a:ea typeface="Courier New" charset="0"/>
                 <a:cs typeface="Courier New" charset="0"/>
               </a:rPr>
               <a:t>name</a:t>
             </a:r>
-            <a:endParaRPr lang="de-DE" sz="1900" dirty="0">
+            <a:endParaRPr lang="de-DE" sz="2000" dirty="0">
               <a:latin typeface="Courier New" charset="0"/>
               <a:ea typeface="Courier New" charset="0"/>
               <a:cs typeface="Courier New" charset="0"/>
@@ -6090,7 +6252,7 @@
               <a:buNone/>
             </a:pPr>
             <a:r>
-              <a:rPr lang="en-US" sz="1900" dirty="0">
+              <a:rPr lang="de-DE" sz="2000" dirty="0">
                 <a:latin typeface="Courier New" charset="0"/>
                 <a:ea typeface="Courier New" charset="0"/>
                 <a:cs typeface="Courier New" charset="0"/>
@@ -6098,7 +6260,7 @@
               <a:t>#SBATCH --reservation=</a:t>
             </a:r>
             <a:r>
-              <a:rPr lang="en-US" sz="1900" dirty="0" err="1">
+              <a:rPr lang="de-DE" sz="2000" dirty="0" err="1">
                 <a:latin typeface="Courier New" charset="0"/>
                 <a:ea typeface="Courier New" charset="0"/>
                 <a:cs typeface="Courier New" charset="0"/>
@@ -6106,14 +6268,38 @@
               <a:t>scbasics</a:t>
             </a:r>
             <a:r>
-              <a:rPr lang="en-US" sz="1900" dirty="0">
-                <a:latin typeface="Courier New" charset="0"/>
-                <a:ea typeface="Courier New" charset="0"/>
-                <a:cs typeface="Courier New" charset="0"/>
-              </a:rPr>
-              <a:t>    # Reservation</a:t>
-            </a:r>
-            <a:endParaRPr lang="de-DE" sz="1900" dirty="0">
+              <a:rPr lang="de-DE" sz="2000" dirty="0">
+                <a:latin typeface="Courier New" charset="0"/>
+                <a:ea typeface="Courier New" charset="0"/>
+                <a:cs typeface="Courier New" charset="0"/>
+              </a:rPr>
+              <a:t>    </a:t>
+            </a:r>
+            <a:r>
+              <a:rPr lang="de-DE" sz="2000" dirty="0" smtClean="0">
+                <a:latin typeface="Courier New" charset="0"/>
+                <a:ea typeface="Courier New" charset="0"/>
+                <a:cs typeface="Courier New" charset="0"/>
+              </a:rPr>
+              <a:t># </a:t>
+            </a:r>
+            <a:r>
+              <a:rPr lang="de-DE" sz="2000" dirty="0">
+                <a:latin typeface="Courier New" charset="0"/>
+                <a:ea typeface="Courier New" charset="0"/>
+                <a:cs typeface="Courier New" charset="0"/>
+              </a:rPr>
+              <a:t>Reservation </a:t>
+            </a:r>
+            <a:r>
+              <a:rPr lang="de-DE" sz="2000" dirty="0" err="1" smtClean="0">
+                <a:latin typeface="Courier New" charset="0"/>
+                <a:ea typeface="Courier New" charset="0"/>
+                <a:cs typeface="Courier New" charset="0"/>
+              </a:rPr>
+              <a:t>name</a:t>
+            </a:r>
+            <a:endParaRPr lang="de-DE" sz="2000" dirty="0">
               <a:latin typeface="Courier New" charset="0"/>
               <a:ea typeface="Courier New" charset="0"/>
               <a:cs typeface="Courier New" charset="0"/>
@@ -6123,7 +6309,7 @@
             <a:pPr marL="114300" indent="0">
               <a:buNone/>
             </a:pPr>
-            <a:endParaRPr lang="de-DE" sz="1900" dirty="0">
+            <a:endParaRPr lang="en-US" sz="2000" dirty="0">
               <a:latin typeface="Courier New" charset="0"/>
               <a:ea typeface="Courier New" charset="0"/>
               <a:cs typeface="Courier New" charset="0"/>
@@ -6133,14 +6319,140 @@
             <a:pPr marL="114300" indent="0">
               <a:buNone/>
             </a:pPr>
-            <a:r>
-              <a:rPr lang="de-DE" sz="1900" dirty="0" err="1">
-                <a:latin typeface="Courier New" charset="0"/>
-                <a:ea typeface="Courier New" charset="0"/>
-                <a:cs typeface="Courier New" charset="0"/>
-              </a:rPr>
-              <a:t>hostname</a:t>
-            </a:r>
+            <a:endParaRPr lang="en-US" sz="2000" dirty="0">
+              <a:latin typeface="Courier New" charset="0"/>
+              <a:ea typeface="Courier New" charset="0"/>
+              <a:cs typeface="Courier New" charset="0"/>
+            </a:endParaRPr>
+          </a:p>
+          <a:p>
+            <a:pPr marL="114300" indent="0">
+              <a:buNone/>
+            </a:pPr>
+            <a:endParaRPr lang="en-US" sz="2000" dirty="0">
+              <a:latin typeface="Courier New" charset="0"/>
+              <a:ea typeface="Courier New" charset="0"/>
+              <a:cs typeface="Courier New" charset="0"/>
+            </a:endParaRPr>
+          </a:p>
+          <a:p>
+            <a:pPr marL="114300" indent="0">
+              <a:buNone/>
+            </a:pPr>
+            <a:r>
+              <a:rPr lang="en-US" sz="2000" dirty="0">
+                <a:latin typeface="Courier New" charset="0"/>
+                <a:ea typeface="Courier New" charset="0"/>
+                <a:cs typeface="Courier New" charset="0"/>
+              </a:rPr>
+              <a:t># Run </a:t>
+            </a:r>
+            <a:r>
+              <a:rPr lang="en-US" sz="2000" dirty="0" err="1">
+                <a:latin typeface="Courier New" charset="0"/>
+                <a:ea typeface="Courier New" charset="0"/>
+                <a:cs typeface="Courier New" charset="0"/>
+              </a:rPr>
+              <a:t>matlab</a:t>
+            </a:r>
+            <a:r>
+              <a:rPr lang="en-US" sz="2000" dirty="0">
+                <a:latin typeface="Courier New" charset="0"/>
+                <a:ea typeface="Courier New" charset="0"/>
+                <a:cs typeface="Courier New" charset="0"/>
+              </a:rPr>
+              <a:t> without a GUI</a:t>
+            </a:r>
+          </a:p>
+          <a:p>
+            <a:pPr marL="114300" indent="0">
+              <a:buNone/>
+            </a:pPr>
+            <a:r>
+              <a:rPr lang="en-US" sz="2000" dirty="0" err="1">
+                <a:latin typeface="Courier New" charset="0"/>
+                <a:ea typeface="Courier New" charset="0"/>
+                <a:cs typeface="Courier New" charset="0"/>
+              </a:rPr>
+              <a:t>matlab</a:t>
+            </a:r>
+            <a:r>
+              <a:rPr lang="en-US" sz="2000" dirty="0">
+                <a:latin typeface="Courier New" charset="0"/>
+                <a:ea typeface="Courier New" charset="0"/>
+                <a:cs typeface="Courier New" charset="0"/>
+              </a:rPr>
+              <a:t> -</a:t>
+            </a:r>
+            <a:r>
+              <a:rPr lang="en-US" sz="2000" dirty="0" err="1">
+                <a:latin typeface="Courier New" charset="0"/>
+                <a:ea typeface="Courier New" charset="0"/>
+                <a:cs typeface="Courier New" charset="0"/>
+              </a:rPr>
+              <a:t>nojvm</a:t>
+            </a:r>
+            <a:r>
+              <a:rPr lang="en-US" sz="2000" dirty="0">
+                <a:latin typeface="Courier New" charset="0"/>
+                <a:ea typeface="Courier New" charset="0"/>
+                <a:cs typeface="Courier New" charset="0"/>
+              </a:rPr>
+              <a:t> -</a:t>
+            </a:r>
+            <a:r>
+              <a:rPr lang="en-US" sz="2000" dirty="0" err="1">
+                <a:latin typeface="Courier New" charset="0"/>
+                <a:ea typeface="Courier New" charset="0"/>
+                <a:cs typeface="Courier New" charset="0"/>
+              </a:rPr>
+              <a:t>nodisplay</a:t>
+            </a:r>
+            <a:r>
+              <a:rPr lang="en-US" sz="2000" dirty="0">
+                <a:latin typeface="Courier New" charset="0"/>
+                <a:ea typeface="Courier New" charset="0"/>
+                <a:cs typeface="Courier New" charset="0"/>
+              </a:rPr>
+              <a:t> -</a:t>
+            </a:r>
+            <a:r>
+              <a:rPr lang="en-US" sz="2000" dirty="0" err="1">
+                <a:latin typeface="Courier New" charset="0"/>
+                <a:ea typeface="Courier New" charset="0"/>
+                <a:cs typeface="Courier New" charset="0"/>
+              </a:rPr>
+              <a:t>nodesktop</a:t>
+            </a:r>
+            <a:r>
+              <a:rPr lang="en-US" sz="2000" dirty="0">
+                <a:latin typeface="Courier New" charset="0"/>
+                <a:ea typeface="Courier New" charset="0"/>
+                <a:cs typeface="Courier New" charset="0"/>
+              </a:rPr>
+              <a:t> -r "clear; </a:t>
+            </a:r>
+            <a:r>
+              <a:rPr lang="en-US" sz="2000" dirty="0" err="1">
+                <a:latin typeface="Courier New" charset="0"/>
+                <a:ea typeface="Courier New" charset="0"/>
+                <a:cs typeface="Courier New" charset="0"/>
+              </a:rPr>
+              <a:t>matlab_tic</a:t>
+            </a:r>
+            <a:r>
+              <a:rPr lang="en-US" sz="2000" dirty="0">
+                <a:latin typeface="Courier New" charset="0"/>
+                <a:ea typeface="Courier New" charset="0"/>
+                <a:cs typeface="Courier New" charset="0"/>
+              </a:rPr>
+              <a:t>;"</a:t>
+            </a:r>
+          </a:p>
+          <a:p>
+            <a:pPr marL="114300" indent="0">
+              <a:buNone/>
+            </a:pPr>
             <a:endParaRPr lang="en-US" sz="1900" dirty="0" smtClean="0">
               <a:latin typeface="Courier New" charset="0"/>
               <a:ea typeface="Courier New" charset="0"/>
@@ -6328,10 +6640,9 @@
           <a:p>
             <a:pPr lvl="1"/>
             <a:r>
-              <a:rPr lang="en-US" dirty="0" err="1" smtClean="0"/>
-              <a:t>Matlab</a:t>
-            </a:r>
-            <a:endParaRPr lang="en-US" dirty="0" smtClean="0"/>
+              <a:rPr lang="en-US" dirty="0" smtClean="0"/>
+              <a:t>Running external scripts</a:t>
+            </a:r>
           </a:p>
           <a:p>
             <a:pPr lvl="1"/>
@@ -6858,6 +7169,738 @@
       </p:grpSpPr>
       <p:sp>
         <p:nvSpPr>
+          <p:cNvPr id="6" name="Title 5"/>
+          <p:cNvSpPr>
+            <a:spLocks noGrp="1"/>
+          </p:cNvSpPr>
+          <p:nvPr>
+            <p:ph type="title"/>
+          </p:nvPr>
+        </p:nvSpPr>
+        <p:spPr/>
+        <p:txBody>
+          <a:bodyPr/>
+          <a:lstStyle/>
+          <a:p>
+            <a:r>
+              <a:rPr lang="en-US" dirty="0" smtClean="0"/>
+              <a:t>Solution – </a:t>
+            </a:r>
+            <a:r>
+              <a:rPr lang="en-US" smtClean="0"/>
+              <a:t>R_code.sh</a:t>
+            </a:r>
+            <a:endParaRPr lang="en-US" dirty="0"/>
+          </a:p>
+        </p:txBody>
+      </p:sp>
+      <p:sp>
+        <p:nvSpPr>
+          <p:cNvPr id="7" name="Content Placeholder 6"/>
+          <p:cNvSpPr>
+            <a:spLocks noGrp="1"/>
+          </p:cNvSpPr>
+          <p:nvPr>
+            <p:ph idx="1"/>
+          </p:nvPr>
+        </p:nvSpPr>
+        <p:spPr>
+          <a:xfrm>
+            <a:off x="0" y="1712891"/>
+            <a:ext cx="9114493" cy="4443210"/>
+          </a:xfrm>
+        </p:spPr>
+        <p:txBody>
+          <a:bodyPr>
+            <a:normAutofit/>
+          </a:bodyPr>
+          <a:lstStyle/>
+          <a:p>
+            <a:pPr marL="114300" indent="0">
+              <a:buNone/>
+            </a:pPr>
+            <a:r>
+              <a:rPr lang="en-US" sz="1800" dirty="0">
+                <a:latin typeface="Courier New" charset="0"/>
+                <a:ea typeface="Courier New" charset="0"/>
+                <a:cs typeface="Courier New" charset="0"/>
+              </a:rPr>
+              <a:t>#!/bin/bash</a:t>
+            </a:r>
+          </a:p>
+          <a:p>
+            <a:pPr marL="114300" indent="0">
+              <a:buNone/>
+            </a:pPr>
+            <a:r>
+              <a:rPr lang="en-US" sz="1800" dirty="0">
+                <a:latin typeface="Courier New" charset="0"/>
+                <a:ea typeface="Courier New" charset="0"/>
+                <a:cs typeface="Courier New" charset="0"/>
+              </a:rPr>
+              <a:t>#SBATCH -N 1                       # Number of requested nodes</a:t>
+            </a:r>
+          </a:p>
+          <a:p>
+            <a:pPr marL="114300" indent="0">
+              <a:buNone/>
+            </a:pPr>
+            <a:r>
+              <a:rPr lang="de-DE" sz="1800" dirty="0">
+                <a:latin typeface="Courier New" charset="0"/>
+                <a:ea typeface="Courier New" charset="0"/>
+                <a:cs typeface="Courier New" charset="0"/>
+              </a:rPr>
+              <a:t>#SBATCH --time=0:01:00             # Max </a:t>
+            </a:r>
+            <a:r>
+              <a:rPr lang="de-DE" sz="1800" dirty="0" err="1">
+                <a:latin typeface="Courier New" charset="0"/>
+                <a:ea typeface="Courier New" charset="0"/>
+                <a:cs typeface="Courier New" charset="0"/>
+              </a:rPr>
+              <a:t>walltime</a:t>
+            </a:r>
+            <a:endParaRPr lang="de-DE" sz="1800" dirty="0">
+              <a:latin typeface="Courier New" charset="0"/>
+              <a:ea typeface="Courier New" charset="0"/>
+              <a:cs typeface="Courier New" charset="0"/>
+            </a:endParaRPr>
+          </a:p>
+          <a:p>
+            <a:pPr marL="114300" indent="0">
+              <a:buNone/>
+            </a:pPr>
+            <a:r>
+              <a:rPr lang="de-DE" sz="1800" dirty="0">
+                <a:latin typeface="Courier New" charset="0"/>
+                <a:ea typeface="Courier New" charset="0"/>
+                <a:cs typeface="Courier New" charset="0"/>
+              </a:rPr>
+              <a:t>#SBATCH --job-name=</a:t>
+            </a:r>
+            <a:r>
+              <a:rPr lang="de-DE" sz="1800" dirty="0" err="1">
+                <a:latin typeface="Courier New" charset="0"/>
+                <a:ea typeface="Courier New" charset="0"/>
+                <a:cs typeface="Courier New" charset="0"/>
+              </a:rPr>
+              <a:t>R_code</a:t>
+            </a:r>
+            <a:r>
+              <a:rPr lang="de-DE" sz="1800" dirty="0">
+                <a:latin typeface="Courier New" charset="0"/>
+                <a:ea typeface="Courier New" charset="0"/>
+                <a:cs typeface="Courier New" charset="0"/>
+              </a:rPr>
+              <a:t>          # Job </a:t>
+            </a:r>
+            <a:r>
+              <a:rPr lang="de-DE" sz="1800" dirty="0" err="1">
+                <a:latin typeface="Courier New" charset="0"/>
+                <a:ea typeface="Courier New" charset="0"/>
+                <a:cs typeface="Courier New" charset="0"/>
+              </a:rPr>
+              <a:t>submission</a:t>
+            </a:r>
+            <a:r>
+              <a:rPr lang="de-DE" sz="1800" dirty="0">
+                <a:latin typeface="Courier New" charset="0"/>
+                <a:ea typeface="Courier New" charset="0"/>
+                <a:cs typeface="Courier New" charset="0"/>
+              </a:rPr>
+              <a:t> </a:t>
+            </a:r>
+            <a:r>
+              <a:rPr lang="de-DE" sz="1800" dirty="0" err="1">
+                <a:latin typeface="Courier New" charset="0"/>
+                <a:ea typeface="Courier New" charset="0"/>
+                <a:cs typeface="Courier New" charset="0"/>
+              </a:rPr>
+              <a:t>name</a:t>
+            </a:r>
+            <a:endParaRPr lang="de-DE" sz="1800" dirty="0">
+              <a:latin typeface="Courier New" charset="0"/>
+              <a:ea typeface="Courier New" charset="0"/>
+              <a:cs typeface="Courier New" charset="0"/>
+            </a:endParaRPr>
+          </a:p>
+          <a:p>
+            <a:pPr marL="114300" indent="0">
+              <a:buNone/>
+            </a:pPr>
+            <a:r>
+              <a:rPr lang="de-DE" sz="1800" dirty="0">
+                <a:latin typeface="Courier New" charset="0"/>
+                <a:ea typeface="Courier New" charset="0"/>
+                <a:cs typeface="Courier New" charset="0"/>
+              </a:rPr>
+              <a:t>#SBATCH --output=</a:t>
+            </a:r>
+            <a:r>
+              <a:rPr lang="de-DE" sz="1800" dirty="0" err="1">
+                <a:latin typeface="Courier New" charset="0"/>
+                <a:ea typeface="Courier New" charset="0"/>
+                <a:cs typeface="Courier New" charset="0"/>
+              </a:rPr>
+              <a:t>R_code.out</a:t>
+            </a:r>
+            <a:r>
+              <a:rPr lang="de-DE" sz="1800" dirty="0">
+                <a:latin typeface="Courier New" charset="0"/>
+                <a:ea typeface="Courier New" charset="0"/>
+                <a:cs typeface="Courier New" charset="0"/>
+              </a:rPr>
+              <a:t>        # Output </a:t>
+            </a:r>
+            <a:r>
+              <a:rPr lang="de-DE" sz="1800" dirty="0" err="1">
+                <a:latin typeface="Courier New" charset="0"/>
+                <a:ea typeface="Courier New" charset="0"/>
+                <a:cs typeface="Courier New" charset="0"/>
+              </a:rPr>
+              <a:t>file</a:t>
+            </a:r>
+            <a:r>
+              <a:rPr lang="de-DE" sz="1800" dirty="0">
+                <a:latin typeface="Courier New" charset="0"/>
+                <a:ea typeface="Courier New" charset="0"/>
+                <a:cs typeface="Courier New" charset="0"/>
+              </a:rPr>
+              <a:t> </a:t>
+            </a:r>
+            <a:r>
+              <a:rPr lang="de-DE" sz="1800" dirty="0" err="1">
+                <a:latin typeface="Courier New" charset="0"/>
+                <a:ea typeface="Courier New" charset="0"/>
+                <a:cs typeface="Courier New" charset="0"/>
+              </a:rPr>
+              <a:t>name</a:t>
+            </a:r>
+            <a:endParaRPr lang="de-DE" sz="1800" dirty="0">
+              <a:latin typeface="Courier New" charset="0"/>
+              <a:ea typeface="Courier New" charset="0"/>
+              <a:cs typeface="Courier New" charset="0"/>
+            </a:endParaRPr>
+          </a:p>
+          <a:p>
+            <a:pPr marL="114300" indent="0">
+              <a:buNone/>
+            </a:pPr>
+            <a:r>
+              <a:rPr lang="de-DE" sz="1800" dirty="0">
+                <a:latin typeface="Courier New" charset="0"/>
+                <a:ea typeface="Courier New" charset="0"/>
+                <a:cs typeface="Courier New" charset="0"/>
+              </a:rPr>
+              <a:t>#SBATCH --reservation=</a:t>
+            </a:r>
+            <a:r>
+              <a:rPr lang="de-DE" sz="1800" dirty="0" err="1">
+                <a:latin typeface="Courier New" charset="0"/>
+                <a:ea typeface="Courier New" charset="0"/>
+                <a:cs typeface="Courier New" charset="0"/>
+              </a:rPr>
+              <a:t>scbasics</a:t>
+            </a:r>
+            <a:r>
+              <a:rPr lang="de-DE" sz="1800" dirty="0">
+                <a:latin typeface="Courier New" charset="0"/>
+                <a:ea typeface="Courier New" charset="0"/>
+                <a:cs typeface="Courier New" charset="0"/>
+              </a:rPr>
+              <a:t>     # Reservation - will </a:t>
+            </a:r>
+            <a:r>
+              <a:rPr lang="de-DE" sz="1800" dirty="0" err="1">
+                <a:latin typeface="Courier New" charset="0"/>
+                <a:ea typeface="Courier New" charset="0"/>
+                <a:cs typeface="Courier New" charset="0"/>
+              </a:rPr>
+              <a:t>only</a:t>
+            </a:r>
+            <a:r>
+              <a:rPr lang="de-DE" sz="1800" dirty="0">
+                <a:latin typeface="Courier New" charset="0"/>
+                <a:ea typeface="Courier New" charset="0"/>
+                <a:cs typeface="Courier New" charset="0"/>
+              </a:rPr>
+              <a:t> </a:t>
+            </a:r>
+            <a:r>
+              <a:rPr lang="de-DE" sz="1800" dirty="0" err="1">
+                <a:latin typeface="Courier New" charset="0"/>
+                <a:ea typeface="Courier New" charset="0"/>
+                <a:cs typeface="Courier New" charset="0"/>
+              </a:rPr>
+              <a:t>work</a:t>
+            </a:r>
+            <a:r>
+              <a:rPr lang="de-DE" sz="1800" dirty="0">
+                <a:latin typeface="Courier New" charset="0"/>
+                <a:ea typeface="Courier New" charset="0"/>
+                <a:cs typeface="Courier New" charset="0"/>
+              </a:rPr>
+              <a:t> </a:t>
+            </a:r>
+            <a:r>
+              <a:rPr lang="de-DE" sz="1800" dirty="0" err="1">
+                <a:latin typeface="Courier New" charset="0"/>
+                <a:ea typeface="Courier New" charset="0"/>
+                <a:cs typeface="Courier New" charset="0"/>
+              </a:rPr>
+              <a:t>during</a:t>
+            </a:r>
+            <a:r>
+              <a:rPr lang="de-DE" sz="1800" dirty="0">
+                <a:latin typeface="Courier New" charset="0"/>
+                <a:ea typeface="Courier New" charset="0"/>
+                <a:cs typeface="Courier New" charset="0"/>
+              </a:rPr>
+              <a:t> </a:t>
+            </a:r>
+            <a:r>
+              <a:rPr lang="de-DE" sz="1800" dirty="0" err="1">
+                <a:latin typeface="Courier New" charset="0"/>
+                <a:ea typeface="Courier New" charset="0"/>
+                <a:cs typeface="Courier New" charset="0"/>
+              </a:rPr>
+              <a:t>workshop</a:t>
+            </a:r>
+            <a:endParaRPr lang="de-DE" sz="1800" dirty="0">
+              <a:latin typeface="Courier New" charset="0"/>
+              <a:ea typeface="Courier New" charset="0"/>
+              <a:cs typeface="Courier New" charset="0"/>
+            </a:endParaRPr>
+          </a:p>
+          <a:p>
+            <a:pPr marL="114300" indent="0">
+              <a:buNone/>
+            </a:pPr>
+            <a:endParaRPr lang="de-DE" sz="1800" dirty="0">
+              <a:latin typeface="Courier New" charset="0"/>
+              <a:ea typeface="Courier New" charset="0"/>
+              <a:cs typeface="Courier New" charset="0"/>
+            </a:endParaRPr>
+          </a:p>
+          <a:p>
+            <a:pPr marL="114300" indent="0">
+              <a:buNone/>
+            </a:pPr>
+            <a:endParaRPr lang="de-DE" sz="1800" dirty="0">
+              <a:latin typeface="Courier New" charset="0"/>
+              <a:ea typeface="Courier New" charset="0"/>
+              <a:cs typeface="Courier New" charset="0"/>
+            </a:endParaRPr>
+          </a:p>
+          <a:p>
+            <a:pPr marL="114300" indent="0">
+              <a:buNone/>
+            </a:pPr>
+            <a:r>
+              <a:rPr lang="de-DE" sz="1800" dirty="0" err="1">
+                <a:latin typeface="Courier New" charset="0"/>
+                <a:ea typeface="Courier New" charset="0"/>
+                <a:cs typeface="Courier New" charset="0"/>
+              </a:rPr>
+              <a:t>Rscript</a:t>
+            </a:r>
+            <a:r>
+              <a:rPr lang="de-DE" sz="1800" dirty="0">
+                <a:latin typeface="Courier New" charset="0"/>
+                <a:ea typeface="Courier New" charset="0"/>
+                <a:cs typeface="Courier New" charset="0"/>
+              </a:rPr>
+              <a:t> </a:t>
+            </a:r>
+            <a:r>
+              <a:rPr lang="de-DE" sz="1800" dirty="0" err="1">
+                <a:latin typeface="Courier New" charset="0"/>
+                <a:ea typeface="Courier New" charset="0"/>
+                <a:cs typeface="Courier New" charset="0"/>
+              </a:rPr>
+              <a:t>R_program.R</a:t>
+            </a:r>
+            <a:endParaRPr lang="en-US" sz="1800" dirty="0" smtClean="0">
+              <a:latin typeface="Courier New" charset="0"/>
+              <a:ea typeface="Courier New" charset="0"/>
+              <a:cs typeface="Courier New" charset="0"/>
+            </a:endParaRPr>
+          </a:p>
+        </p:txBody>
+      </p:sp>
+      <p:sp>
+        <p:nvSpPr>
+          <p:cNvPr id="4" name="Date Placeholder 3"/>
+          <p:cNvSpPr>
+            <a:spLocks noGrp="1"/>
+          </p:cNvSpPr>
+          <p:nvPr>
+            <p:ph type="dt" sz="half" idx="10"/>
+          </p:nvPr>
+        </p:nvSpPr>
+        <p:spPr/>
+        <p:txBody>
+          <a:bodyPr/>
+          <a:lstStyle/>
+          <a:p>
+            <a:fld id="{88C52C92-F66E-3F42-A0C5-49F4D61A5160}" type="datetime1">
+              <a:rPr lang="en-US" smtClean="0"/>
+              <a:t>7/16/16</a:t>
+            </a:fld>
+            <a:endParaRPr lang="en-US"/>
+          </a:p>
+        </p:txBody>
+      </p:sp>
+      <p:sp>
+        <p:nvSpPr>
+          <p:cNvPr id="8" name="Footer Placeholder 7"/>
+          <p:cNvSpPr>
+            <a:spLocks noGrp="1"/>
+          </p:cNvSpPr>
+          <p:nvPr>
+            <p:ph type="ftr" sz="quarter" idx="11"/>
+          </p:nvPr>
+        </p:nvSpPr>
+        <p:spPr/>
+        <p:txBody>
+          <a:bodyPr/>
+          <a:lstStyle/>
+          <a:p>
+            <a:r>
+              <a:rPr lang="en-US" smtClean="0"/>
+              <a:t>Basics of Supercomputing</a:t>
+            </a:r>
+            <a:endParaRPr lang="en-US"/>
+          </a:p>
+        </p:txBody>
+      </p:sp>
+      <p:sp>
+        <p:nvSpPr>
+          <p:cNvPr id="5" name="Slide Number Placeholder 4"/>
+          <p:cNvSpPr>
+            <a:spLocks noGrp="1"/>
+          </p:cNvSpPr>
+          <p:nvPr>
+            <p:ph type="sldNum" sz="quarter" idx="4"/>
+          </p:nvPr>
+        </p:nvSpPr>
+        <p:spPr/>
+        <p:txBody>
+          <a:bodyPr/>
+          <a:lstStyle/>
+          <a:p>
+            <a:fld id="{249E94F7-107C-CE46-8C56-9CACFF99CD93}" type="slidenum">
+              <a:rPr lang="en-US" smtClean="0"/>
+              <a:pPr/>
+              <a:t>21</a:t>
+            </a:fld>
+            <a:endParaRPr lang="en-US" dirty="0"/>
+          </a:p>
+        </p:txBody>
+      </p:sp>
+    </p:spTree>
+    <p:extLst>
+      <p:ext uri="{BB962C8B-B14F-4D97-AF65-F5344CB8AC3E}">
+        <p14:creationId xmlns:p14="http://schemas.microsoft.com/office/powerpoint/2010/main" val="2027917261"/>
+      </p:ext>
+    </p:extLst>
+  </p:cSld>
+  <p:clrMapOvr>
+    <a:masterClrMapping/>
+  </p:clrMapOvr>
+  <p:timing>
+    <p:tnLst>
+      <p:par>
+        <p:cTn id="1" dur="indefinite" restart="never" nodeType="tmRoot"/>
+      </p:par>
+    </p:tnLst>
+  </p:timing>
+</p:sld>
+</file>
+
+<file path=ppt/slides/slide22.xml><?xml version="1.0" encoding="utf-8"?>
+<p:sld xmlns:a="http://schemas.openxmlformats.org/drawingml/2006/main" xmlns:r="http://schemas.openxmlformats.org/officeDocument/2006/relationships" xmlns:p="http://schemas.openxmlformats.org/presentationml/2006/main">
+  <p:cSld>
+    <p:spTree>
+      <p:nvGrpSpPr>
+        <p:cNvPr id="1" name=""/>
+        <p:cNvGrpSpPr/>
+        <p:nvPr/>
+      </p:nvGrpSpPr>
+      <p:grpSpPr>
+        <a:xfrm>
+          <a:off x="0" y="0"/>
+          <a:ext cx="0" cy="0"/>
+          <a:chOff x="0" y="0"/>
+          <a:chExt cx="0" cy="0"/>
+        </a:xfrm>
+      </p:grpSpPr>
+      <p:sp>
+        <p:nvSpPr>
+          <p:cNvPr id="6" name="Title 5"/>
+          <p:cNvSpPr>
+            <a:spLocks noGrp="1"/>
+          </p:cNvSpPr>
+          <p:nvPr>
+            <p:ph type="title"/>
+          </p:nvPr>
+        </p:nvSpPr>
+        <p:spPr/>
+        <p:txBody>
+          <a:bodyPr/>
+          <a:lstStyle/>
+          <a:p>
+            <a:r>
+              <a:rPr lang="en-US" dirty="0" smtClean="0"/>
+              <a:t>Solution – </a:t>
+            </a:r>
+            <a:r>
+              <a:rPr lang="en-US" dirty="0" err="1" smtClean="0"/>
+              <a:t>R_program.R</a:t>
+            </a:r>
+            <a:endParaRPr lang="en-US" dirty="0"/>
+          </a:p>
+        </p:txBody>
+      </p:sp>
+      <p:sp>
+        <p:nvSpPr>
+          <p:cNvPr id="7" name="Content Placeholder 6"/>
+          <p:cNvSpPr>
+            <a:spLocks noGrp="1"/>
+          </p:cNvSpPr>
+          <p:nvPr>
+            <p:ph idx="1"/>
+          </p:nvPr>
+        </p:nvSpPr>
+        <p:spPr>
+          <a:xfrm>
+            <a:off x="0" y="1712891"/>
+            <a:ext cx="9114493" cy="4443210"/>
+          </a:xfrm>
+        </p:spPr>
+        <p:txBody>
+          <a:bodyPr>
+            <a:normAutofit/>
+          </a:bodyPr>
+          <a:lstStyle/>
+          <a:p>
+            <a:pPr marL="114300" indent="0">
+              <a:buNone/>
+            </a:pPr>
+            <a:r>
+              <a:rPr lang="en-US" sz="1800" dirty="0">
+                <a:latin typeface="Courier New" charset="0"/>
+                <a:ea typeface="Courier New" charset="0"/>
+                <a:cs typeface="Courier New" charset="0"/>
+              </a:rPr>
+              <a:t>#Simple R code example by Shelley Knuth (</a:t>
+            </a:r>
+            <a:r>
+              <a:rPr lang="en-US" sz="1800" dirty="0" err="1">
+                <a:latin typeface="Courier New" charset="0"/>
+                <a:ea typeface="Courier New" charset="0"/>
+                <a:cs typeface="Courier New" charset="0"/>
+              </a:rPr>
+              <a:t>shelley.knuth@colorado.edu</a:t>
+            </a:r>
+            <a:r>
+              <a:rPr lang="en-US" sz="1800" dirty="0">
+                <a:latin typeface="Courier New" charset="0"/>
+                <a:ea typeface="Courier New" charset="0"/>
+                <a:cs typeface="Courier New" charset="0"/>
+              </a:rPr>
+              <a:t>)</a:t>
+            </a:r>
+          </a:p>
+          <a:p>
+            <a:pPr marL="114300" indent="0">
+              <a:buNone/>
+            </a:pPr>
+            <a:endParaRPr lang="en-US" sz="1800" dirty="0">
+              <a:latin typeface="Courier New" charset="0"/>
+              <a:ea typeface="Courier New" charset="0"/>
+              <a:cs typeface="Courier New" charset="0"/>
+            </a:endParaRPr>
+          </a:p>
+          <a:p>
+            <a:pPr marL="114300" indent="0">
+              <a:buNone/>
+            </a:pPr>
+            <a:r>
+              <a:rPr lang="en-US" sz="1800" dirty="0">
+                <a:latin typeface="Courier New" charset="0"/>
+                <a:ea typeface="Courier New" charset="0"/>
+                <a:cs typeface="Courier New" charset="0"/>
+              </a:rPr>
+              <a:t># Create vector</a:t>
+            </a:r>
+          </a:p>
+          <a:p>
+            <a:pPr marL="114300" indent="0">
+              <a:buNone/>
+            </a:pPr>
+            <a:r>
+              <a:rPr lang="en-US" sz="1800" dirty="0">
+                <a:latin typeface="Courier New" charset="0"/>
+                <a:ea typeface="Courier New" charset="0"/>
+                <a:cs typeface="Courier New" charset="0"/>
+              </a:rPr>
+              <a:t>planets &lt;- c("Mercury", "Venus", "Earth", "Mars", "Jupiter", "Saturn", "Uranus", "Neptune", "Pluto")</a:t>
+            </a:r>
+          </a:p>
+          <a:p>
+            <a:pPr marL="114300" indent="0">
+              <a:buNone/>
+            </a:pPr>
+            <a:endParaRPr lang="en-US" sz="1800" dirty="0">
+              <a:latin typeface="Courier New" charset="0"/>
+              <a:ea typeface="Courier New" charset="0"/>
+              <a:cs typeface="Courier New" charset="0"/>
+            </a:endParaRPr>
+          </a:p>
+          <a:p>
+            <a:pPr marL="114300" indent="0">
+              <a:buNone/>
+            </a:pPr>
+            <a:r>
+              <a:rPr lang="en-US" sz="1800" dirty="0">
+                <a:latin typeface="Courier New" charset="0"/>
+                <a:ea typeface="Courier New" charset="0"/>
+                <a:cs typeface="Courier New" charset="0"/>
+              </a:rPr>
+              <a:t># Print off vector</a:t>
+            </a:r>
+          </a:p>
+          <a:p>
+            <a:pPr marL="114300" indent="0">
+              <a:buNone/>
+            </a:pPr>
+            <a:r>
+              <a:rPr lang="en-US" sz="1800" dirty="0">
+                <a:latin typeface="Courier New" charset="0"/>
+                <a:ea typeface="Courier New" charset="0"/>
+                <a:cs typeface="Courier New" charset="0"/>
+              </a:rPr>
+              <a:t>planets</a:t>
+            </a:r>
+            <a:endParaRPr lang="en-US" sz="1800" dirty="0" smtClean="0">
+              <a:latin typeface="Courier New" charset="0"/>
+              <a:ea typeface="Courier New" charset="0"/>
+              <a:cs typeface="Courier New" charset="0"/>
+            </a:endParaRPr>
+          </a:p>
+        </p:txBody>
+      </p:sp>
+      <p:sp>
+        <p:nvSpPr>
+          <p:cNvPr id="4" name="Date Placeholder 3"/>
+          <p:cNvSpPr>
+            <a:spLocks noGrp="1"/>
+          </p:cNvSpPr>
+          <p:nvPr>
+            <p:ph type="dt" sz="half" idx="10"/>
+          </p:nvPr>
+        </p:nvSpPr>
+        <p:spPr/>
+        <p:txBody>
+          <a:bodyPr/>
+          <a:lstStyle/>
+          <a:p>
+            <a:fld id="{88C52C92-F66E-3F42-A0C5-49F4D61A5160}" type="datetime1">
+              <a:rPr lang="en-US" smtClean="0"/>
+              <a:t>7/16/16</a:t>
+            </a:fld>
+            <a:endParaRPr lang="en-US"/>
+          </a:p>
+        </p:txBody>
+      </p:sp>
+      <p:sp>
+        <p:nvSpPr>
+          <p:cNvPr id="8" name="Footer Placeholder 7"/>
+          <p:cNvSpPr>
+            <a:spLocks noGrp="1"/>
+          </p:cNvSpPr>
+          <p:nvPr>
+            <p:ph type="ftr" sz="quarter" idx="11"/>
+          </p:nvPr>
+        </p:nvSpPr>
+        <p:spPr/>
+        <p:txBody>
+          <a:bodyPr/>
+          <a:lstStyle/>
+          <a:p>
+            <a:r>
+              <a:rPr lang="en-US" smtClean="0"/>
+              <a:t>Basics of Supercomputing</a:t>
+            </a:r>
+            <a:endParaRPr lang="en-US"/>
+          </a:p>
+        </p:txBody>
+      </p:sp>
+      <p:sp>
+        <p:nvSpPr>
+          <p:cNvPr id="5" name="Slide Number Placeholder 4"/>
+          <p:cNvSpPr>
+            <a:spLocks noGrp="1"/>
+          </p:cNvSpPr>
+          <p:nvPr>
+            <p:ph type="sldNum" sz="quarter" idx="4"/>
+          </p:nvPr>
+        </p:nvSpPr>
+        <p:spPr/>
+        <p:txBody>
+          <a:bodyPr/>
+          <a:lstStyle/>
+          <a:p>
+            <a:fld id="{249E94F7-107C-CE46-8C56-9CACFF99CD93}" type="slidenum">
+              <a:rPr lang="en-US" smtClean="0"/>
+              <a:pPr/>
+              <a:t>22</a:t>
+            </a:fld>
+            <a:endParaRPr lang="en-US" dirty="0"/>
+          </a:p>
+        </p:txBody>
+      </p:sp>
+    </p:spTree>
+    <p:extLst>
+      <p:ext uri="{BB962C8B-B14F-4D97-AF65-F5344CB8AC3E}">
+        <p14:creationId xmlns:p14="http://schemas.microsoft.com/office/powerpoint/2010/main" val="885796570"/>
+      </p:ext>
+    </p:extLst>
+  </p:cSld>
+  <p:clrMapOvr>
+    <a:masterClrMapping/>
+  </p:clrMapOvr>
+  <p:timing>
+    <p:tnLst>
+      <p:par>
+        <p:cTn id="1" dur="indefinite" restart="never" nodeType="tmRoot"/>
+      </p:par>
+    </p:tnLst>
+  </p:timing>
+</p:sld>
+</file>
+
+<file path=ppt/slides/slide23.xml><?xml version="1.0" encoding="utf-8"?>
+<p:sld xmlns:a="http://schemas.openxmlformats.org/drawingml/2006/main" xmlns:r="http://schemas.openxmlformats.org/officeDocument/2006/relationships" xmlns:p="http://schemas.openxmlformats.org/presentationml/2006/main">
+  <p:cSld>
+    <p:spTree>
+      <p:nvGrpSpPr>
+        <p:cNvPr id="1" name=""/>
+        <p:cNvGrpSpPr/>
+        <p:nvPr/>
+      </p:nvGrpSpPr>
+      <p:grpSpPr>
+        <a:xfrm>
+          <a:off x="0" y="0"/>
+          <a:ext cx="0" cy="0"/>
+          <a:chOff x="0" y="0"/>
+          <a:chExt cx="0" cy="0"/>
+        </a:xfrm>
+      </p:grpSpPr>
+      <p:sp>
+        <p:nvSpPr>
           <p:cNvPr id="2" name="Title 1"/>
           <p:cNvSpPr>
             <a:spLocks noGrp="1"/>
@@ -7031,7 +8074,7 @@
             <a:fld id="{249E94F7-107C-CE46-8C56-9CACFF99CD93}" type="slidenum">
               <a:rPr lang="en-US" smtClean="0"/>
               <a:pPr/>
-              <a:t>21</a:t>
+              <a:t>23</a:t>
             </a:fld>
             <a:endParaRPr lang="en-US" dirty="0"/>
           </a:p>

</xml_diff>